<commit_message>
Added Demo slide to presentation
</commit_message>
<xml_diff>
--- a/Trimester One/Documentation/Presentation/Presentation.pptx
+++ b/Trimester One/Documentation/Presentation/Presentation.pptx
@@ -5,7 +5,7 @@
     <p:sldMasterId id="2147483672" r:id="rId1"/>
   </p:sldMasterIdLst>
   <p:notesMasterIdLst>
-    <p:notesMasterId r:id="rId8"/>
+    <p:notesMasterId r:id="rId9"/>
   </p:notesMasterIdLst>
   <p:sldIdLst>
     <p:sldId id="257" r:id="rId2"/>
@@ -14,6 +14,7 @@
     <p:sldId id="261" r:id="rId5"/>
     <p:sldId id="262" r:id="rId6"/>
     <p:sldId id="260" r:id="rId7"/>
+    <p:sldId id="263" r:id="rId8"/>
   </p:sldIdLst>
   <p:sldSz cx="12192000" cy="6858000"/>
   <p:notesSz cx="6858000" cy="9144000"/>
@@ -3614,13 +3615,13 @@
   <p:clrMapOvr>
     <a:masterClrMapping/>
   </p:clrMapOvr>
-  <mc:AlternateContent xmlns:mc="http://schemas.openxmlformats.org/markup-compatibility/2006">
-    <mc:Choice xmlns:p159="http://schemas.microsoft.com/office/powerpoint/2015/09/main" Requires="p159">
+  <mc:AlternateContent xmlns:mc="http://schemas.openxmlformats.org/markup-compatibility/2006" xmlns:p159="http://schemas.microsoft.com/office/powerpoint/2015/09/main">
+    <mc:Choice Requires="p159">
       <p:transition xmlns:p14="http://schemas.microsoft.com/office/powerpoint/2010/main" spd="slow" p14:dur="2000">
         <p159:morph option="byObject"/>
       </p:transition>
     </mc:Choice>
-    <mc:Fallback>
+    <mc:Fallback xmlns="">
       <p:transition spd="slow">
         <p:fade/>
       </p:transition>
@@ -3807,13 +3808,13 @@
   <p:clrMapOvr>
     <a:overrideClrMapping bg1="dk1" tx1="lt1" bg2="dk2" tx2="lt2" accent1="accent1" accent2="accent2" accent3="accent3" accent4="accent4" accent5="accent5" accent6="accent6" hlink="hlink" folHlink="folHlink"/>
   </p:clrMapOvr>
-  <mc:AlternateContent xmlns:mc="http://schemas.openxmlformats.org/markup-compatibility/2006">
-    <mc:Choice xmlns:p159="http://schemas.microsoft.com/office/powerpoint/2015/09/main" Requires="p159">
+  <mc:AlternateContent xmlns:mc="http://schemas.openxmlformats.org/markup-compatibility/2006" xmlns:p159="http://schemas.microsoft.com/office/powerpoint/2015/09/main">
+    <mc:Choice Requires="p159">
       <p:transition xmlns:p14="http://schemas.microsoft.com/office/powerpoint/2010/main" spd="slow" p14:dur="2000">
         <p159:morph option="byObject"/>
       </p:transition>
     </mc:Choice>
-    <mc:Fallback>
+    <mc:Fallback xmlns="">
       <p:transition spd="slow">
         <p:fade/>
       </p:transition>
@@ -4069,13 +4070,13 @@
   <p:clrMapOvr>
     <a:overrideClrMapping bg1="dk1" tx1="lt1" bg2="dk2" tx2="lt2" accent1="accent1" accent2="accent2" accent3="accent3" accent4="accent4" accent5="accent5" accent6="accent6" hlink="hlink" folHlink="folHlink"/>
   </p:clrMapOvr>
-  <mc:AlternateContent xmlns:mc="http://schemas.openxmlformats.org/markup-compatibility/2006">
-    <mc:Choice xmlns:p159="http://schemas.microsoft.com/office/powerpoint/2015/09/main" Requires="p159">
+  <mc:AlternateContent xmlns:mc="http://schemas.openxmlformats.org/markup-compatibility/2006" xmlns:p159="http://schemas.microsoft.com/office/powerpoint/2015/09/main">
+    <mc:Choice Requires="p159">
       <p:transition xmlns:p14="http://schemas.microsoft.com/office/powerpoint/2010/main" spd="slow" p14:dur="2000">
         <p159:morph option="byObject"/>
       </p:transition>
     </mc:Choice>
-    <mc:Fallback>
+    <mc:Fallback xmlns="">
       <p:transition spd="slow">
         <p:fade/>
       </p:transition>
@@ -4305,13 +4306,13 @@
   <p:clrMapOvr>
     <a:overrideClrMapping bg1="dk1" tx1="lt1" bg2="dk2" tx2="lt2" accent1="accent1" accent2="accent2" accent3="accent3" accent4="accent4" accent5="accent5" accent6="accent6" hlink="hlink" folHlink="folHlink"/>
   </p:clrMapOvr>
-  <mc:AlternateContent xmlns:mc="http://schemas.openxmlformats.org/markup-compatibility/2006">
-    <mc:Choice xmlns:p159="http://schemas.microsoft.com/office/powerpoint/2015/09/main" Requires="p159">
+  <mc:AlternateContent xmlns:mc="http://schemas.openxmlformats.org/markup-compatibility/2006" xmlns:p159="http://schemas.microsoft.com/office/powerpoint/2015/09/main">
+    <mc:Choice Requires="p159">
       <p:transition xmlns:p14="http://schemas.microsoft.com/office/powerpoint/2010/main" spd="slow" p14:dur="2000">
         <p159:morph option="byObject"/>
       </p:transition>
     </mc:Choice>
-    <mc:Fallback>
+    <mc:Fallback xmlns="">
       <p:transition spd="slow">
         <p:fade/>
       </p:transition>
@@ -4561,13 +4562,13 @@
   <p:clrMapOvr>
     <a:overrideClrMapping bg1="dk1" tx1="lt1" bg2="dk2" tx2="lt2" accent1="accent1" accent2="accent2" accent3="accent3" accent4="accent4" accent5="accent5" accent6="accent6" hlink="hlink" folHlink="folHlink"/>
   </p:clrMapOvr>
-  <mc:AlternateContent xmlns:mc="http://schemas.openxmlformats.org/markup-compatibility/2006">
-    <mc:Choice xmlns:p159="http://schemas.microsoft.com/office/powerpoint/2015/09/main" Requires="p159">
+  <mc:AlternateContent xmlns:mc="http://schemas.openxmlformats.org/markup-compatibility/2006" xmlns:p159="http://schemas.microsoft.com/office/powerpoint/2015/09/main">
+    <mc:Choice Requires="p159">
       <p:transition xmlns:p14="http://schemas.microsoft.com/office/powerpoint/2010/main" spd="slow" p14:dur="2000">
         <p159:morph option="byObject"/>
       </p:transition>
     </mc:Choice>
-    <mc:Fallback>
+    <mc:Fallback xmlns="">
       <p:transition spd="slow">
         <p:fade/>
       </p:transition>
@@ -4804,13 +4805,249 @@
   <p:clrMapOvr>
     <a:overrideClrMapping bg1="dk1" tx1="lt1" bg2="dk2" tx2="lt2" accent1="accent1" accent2="accent2" accent3="accent3" accent4="accent4" accent5="accent5" accent6="accent6" hlink="hlink" folHlink="folHlink"/>
   </p:clrMapOvr>
-  <mc:AlternateContent xmlns:mc="http://schemas.openxmlformats.org/markup-compatibility/2006">
-    <mc:Choice xmlns:p159="http://schemas.microsoft.com/office/powerpoint/2015/09/main" Requires="p159">
+  <mc:AlternateContent xmlns:mc="http://schemas.openxmlformats.org/markup-compatibility/2006" xmlns:p159="http://schemas.microsoft.com/office/powerpoint/2015/09/main">
+    <mc:Choice Requires="p159">
       <p:transition xmlns:p14="http://schemas.microsoft.com/office/powerpoint/2010/main" spd="slow" p14:dur="2000">
         <p159:morph option="byObject"/>
       </p:transition>
     </mc:Choice>
-    <mc:Fallback>
+    <mc:Fallback xmlns="">
+      <p:transition spd="slow">
+        <p:fade/>
+      </p:transition>
+    </mc:Fallback>
+  </mc:AlternateContent>
+</p:sld>
+</file>
+
+<file path=ppt/slides/slide7.xml><?xml version="1.0" encoding="utf-8"?>
+<p:sld xmlns:a="http://schemas.openxmlformats.org/drawingml/2006/main" xmlns:r="http://schemas.openxmlformats.org/officeDocument/2006/relationships" xmlns:p="http://schemas.openxmlformats.org/presentationml/2006/main">
+  <p:cSld>
+    <p:spTree>
+      <p:nvGrpSpPr>
+        <p:cNvPr id="1" name=""/>
+        <p:cNvGrpSpPr/>
+        <p:nvPr/>
+      </p:nvGrpSpPr>
+      <p:grpSpPr>
+        <a:xfrm>
+          <a:off x="0" y="0"/>
+          <a:ext cx="0" cy="0"/>
+          <a:chOff x="0" y="0"/>
+          <a:chExt cx="0" cy="0"/>
+        </a:xfrm>
+      </p:grpSpPr>
+      <p:pic>
+        <p:nvPicPr>
+          <p:cNvPr id="5" name="Content Placeholder 4"/>
+          <p:cNvPicPr>
+            <a:picLocks noChangeAspect="1"/>
+          </p:cNvPicPr>
+          <p:nvPr/>
+        </p:nvPicPr>
+        <p:blipFill rotWithShape="1">
+          <a:blip r:embed="rId2">
+            <a:alphaModFix amt="35000"/>
+            <a:extLst>
+              <a:ext uri="{28A0092B-C50C-407E-A947-70E740481C1C}">
+                <a14:useLocalDpi xmlns:a14="http://schemas.microsoft.com/office/drawing/2010/main" val="0"/>
+              </a:ext>
+              <a:ext uri="{96DAC541-7B7A-43D3-8B79-37D633B846F1}">
+                <asvg:svgBlip xmlns:asvg="http://schemas.microsoft.com/office/drawing/2016/SVG/main" r:embed="rId3"/>
+              </a:ext>
+            </a:extLst>
+          </a:blip>
+          <a:srcRect t="7864" b="7866"/>
+          <a:stretch/>
+        </p:blipFill>
+        <p:spPr>
+          <a:xfrm>
+            <a:off x="15" y="0"/>
+            <a:ext cx="12191985" cy="6857993"/>
+          </a:xfrm>
+          <a:prstGeom prst="rect">
+            <a:avLst/>
+          </a:prstGeom>
+        </p:spPr>
+      </p:pic>
+      <p:sp>
+        <p:nvSpPr>
+          <p:cNvPr id="2" name="Title 1"/>
+          <p:cNvSpPr>
+            <a:spLocks noGrp="1"/>
+          </p:cNvSpPr>
+          <p:nvPr>
+            <p:ph type="title"/>
+          </p:nvPr>
+        </p:nvSpPr>
+        <p:spPr>
+          <a:xfrm>
+            <a:off x="2152650" y="1131094"/>
+            <a:ext cx="7886700" cy="994172"/>
+          </a:xfrm>
+        </p:spPr>
+        <p:txBody>
+          <a:bodyPr vert="horz" lIns="68580" tIns="34290" rIns="68580" bIns="34290" rtlCol="0" anchor="ctr">
+            <a:normAutofit/>
+          </a:bodyPr>
+          <a:lstStyle/>
+          <a:p>
+            <a:r>
+              <a:rPr lang="en-US" b="1" dirty="0">
+                <a:solidFill>
+                  <a:srgbClr val="FFFFFF"/>
+                </a:solidFill>
+                <a:latin typeface="Segoe UI Light" panose="020B0502040204020203" pitchFamily="34" charset="0"/>
+                <a:cs typeface="Segoe UI Light" panose="020B0502040204020203" pitchFamily="34" charset="0"/>
+              </a:rPr>
+              <a:t>Demo</a:t>
+            </a:r>
+          </a:p>
+        </p:txBody>
+      </p:sp>
+      <p:sp>
+        <p:nvSpPr>
+          <p:cNvPr id="21" name="Content Placeholder 20"/>
+          <p:cNvSpPr>
+            <a:spLocks noGrp="1"/>
+          </p:cNvSpPr>
+          <p:nvPr>
+            <p:ph idx="1"/>
+          </p:nvPr>
+        </p:nvSpPr>
+        <p:spPr>
+          <a:xfrm>
+            <a:off x="2152650" y="2226469"/>
+            <a:ext cx="7886700" cy="3263504"/>
+          </a:xfrm>
+        </p:spPr>
+        <p:txBody>
+          <a:bodyPr>
+            <a:normAutofit/>
+          </a:bodyPr>
+          <a:lstStyle/>
+          <a:p>
+            <a:r>
+              <a:rPr lang="en-US" dirty="0">
+                <a:solidFill>
+                  <a:srgbClr val="FFFFFF"/>
+                </a:solidFill>
+              </a:rPr>
+              <a:t>Basic foundations</a:t>
+            </a:r>
+          </a:p>
+          <a:p>
+            <a:r>
+              <a:rPr lang="en-US" dirty="0">
+                <a:solidFill>
+                  <a:srgbClr val="FFFFFF"/>
+                </a:solidFill>
+              </a:rPr>
+              <a:t>Procedural terrain generation</a:t>
+            </a:r>
+          </a:p>
+          <a:p>
+            <a:r>
+              <a:rPr lang="en-US" dirty="0">
+                <a:solidFill>
+                  <a:srgbClr val="FFFFFF"/>
+                </a:solidFill>
+              </a:rPr>
+              <a:t>Object placement</a:t>
+            </a:r>
+          </a:p>
+          <a:p>
+            <a:r>
+              <a:rPr lang="en-US" dirty="0">
+                <a:solidFill>
+                  <a:srgbClr val="FFFFFF"/>
+                </a:solidFill>
+              </a:rPr>
+              <a:t>Job system</a:t>
+            </a:r>
+          </a:p>
+          <a:p>
+            <a:r>
+              <a:rPr lang="en-US" dirty="0">
+                <a:solidFill>
+                  <a:srgbClr val="FFFFFF"/>
+                </a:solidFill>
+              </a:rPr>
+              <a:t>Basic citizen AI</a:t>
+            </a:r>
+          </a:p>
+          <a:p>
+            <a:pPr marL="457200" lvl="1" indent="0">
+              <a:buNone/>
+            </a:pPr>
+            <a:endParaRPr lang="en-US" dirty="0">
+              <a:solidFill>
+                <a:srgbClr val="FFFFFF"/>
+              </a:solidFill>
+            </a:endParaRPr>
+          </a:p>
+        </p:txBody>
+      </p:sp>
+      <p:pic>
+        <p:nvPicPr>
+          <p:cNvPr id="8" name="Picture 7">
+            <a:extLst>
+              <a:ext uri="{FF2B5EF4-FFF2-40B4-BE49-F238E27FC236}">
+                <a16:creationId xmlns:a16="http://schemas.microsoft.com/office/drawing/2014/main" id="{D0BA864B-F682-4B60-8A8E-AC4DEDD1E008}"/>
+              </a:ext>
+            </a:extLst>
+          </p:cNvPr>
+          <p:cNvPicPr>
+            <a:picLocks noChangeAspect="1"/>
+          </p:cNvPicPr>
+          <p:nvPr/>
+        </p:nvPicPr>
+        <p:blipFill>
+          <a:blip r:embed="rId4">
+            <a:extLst>
+              <a:ext uri="{28A0092B-C50C-407E-A947-70E740481C1C}">
+                <a14:useLocalDpi xmlns:a14="http://schemas.microsoft.com/office/drawing/2010/main" val="0"/>
+              </a:ext>
+            </a:extLst>
+          </a:blip>
+          <a:stretch>
+            <a:fillRect/>
+          </a:stretch>
+        </p:blipFill>
+        <p:spPr>
+          <a:xfrm>
+            <a:off x="8481383" y="2627890"/>
+            <a:ext cx="2876378" cy="2460661"/>
+          </a:xfrm>
+          <a:prstGeom prst="rect">
+            <a:avLst/>
+          </a:prstGeom>
+          <a:effectLst>
+            <a:glow rad="101600">
+              <a:schemeClr val="tx1">
+                <a:alpha val="60000"/>
+              </a:schemeClr>
+            </a:glow>
+          </a:effectLst>
+        </p:spPr>
+      </p:pic>
+    </p:spTree>
+    <p:extLst>
+      <p:ext uri="{BB962C8B-B14F-4D97-AF65-F5344CB8AC3E}">
+        <p14:creationId xmlns:p14="http://schemas.microsoft.com/office/powerpoint/2010/main" val="3746679099"/>
+      </p:ext>
+    </p:extLst>
+  </p:cSld>
+  <p:clrMapOvr>
+    <a:overrideClrMapping bg1="dk1" tx1="lt1" bg2="dk2" tx2="lt2" accent1="accent1" accent2="accent2" accent3="accent3" accent4="accent4" accent5="accent5" accent6="accent6" hlink="hlink" folHlink="folHlink"/>
+  </p:clrMapOvr>
+  <mc:AlternateContent xmlns:mc="http://schemas.openxmlformats.org/markup-compatibility/2006" xmlns:p159="http://schemas.microsoft.com/office/powerpoint/2015/09/main">
+    <mc:Choice Requires="p159">
+      <p:transition xmlns:p14="http://schemas.microsoft.com/office/powerpoint/2010/main" spd="slow" p14:dur="2000">
+        <p159:morph option="byObject"/>
+      </p:transition>
+    </mc:Choice>
+    <mc:Fallback xmlns="">
       <p:transition spd="slow">
         <p:fade/>
       </p:transition>

</xml_diff>